<commit_message>
minor formatting changes in the pptx
</commit_message>
<xml_diff>
--- a/doc/contact-lookup-flow.pptx
+++ b/doc/contact-lookup-flow.pptx
@@ -3413,8 +3413,8 @@
           </p:nvCxnSpPr>
           <p:spPr>
             <a:xfrm rot="5400000">
-              <a:off x="5308066" y="1201010"/>
-              <a:ext cx="1394380" cy="1477393"/>
+              <a:off x="5356382" y="1249326"/>
+              <a:ext cx="1394380" cy="1380760"/>
             </a:xfrm>
             <a:prstGeom prst="bentConnector3">
               <a:avLst/>
@@ -3448,13 +3448,13 @@
           </p:nvCxnSpPr>
           <p:spPr>
             <a:xfrm rot="5400000" flipH="1">
-              <a:off x="3228540" y="968210"/>
-              <a:ext cx="1915575" cy="2160463"/>
+              <a:off x="3276859" y="919896"/>
+              <a:ext cx="1915571" cy="2257094"/>
             </a:xfrm>
             <a:prstGeom prst="bentConnector4">
               <a:avLst>
-                <a:gd name="adj1" fmla="val -45807"/>
-                <a:gd name="adj2" fmla="val 71885"/>
+                <a:gd name="adj1" fmla="val -11934"/>
+                <a:gd name="adj2" fmla="val 73089"/>
               </a:avLst>
             </a:prstGeom>
             <a:ln>
@@ -4033,40 +4033,6 @@
             </a:fontRef>
           </p:style>
         </p:cxnSp>
-        <p:sp>
-          <p:nvSpPr>
-            <p:cNvPr id="13" name="Textfeld 12"/>
-            <p:cNvSpPr txBox="1"/>
-            <p:nvPr/>
-          </p:nvSpPr>
-          <p:spPr>
-            <a:xfrm>
-              <a:off x="4320925" y="2636896"/>
-              <a:ext cx="1891267" cy="369332"/>
-            </a:xfrm>
-            <a:prstGeom prst="rect">
-              <a:avLst/>
-            </a:prstGeom>
-            <a:noFill/>
-          </p:spPr>
-          <p:txBody>
-            <a:bodyPr wrap="square" rtlCol="0">
-              <a:spAutoFit/>
-            </a:bodyPr>
-            <a:lstStyle/>
-            <a:p>
-              <a:r>
-                <a:rPr lang="de-DE" dirty="0" err="1" smtClean="0"/>
-                <a:t>Gethostbyname</a:t>
-              </a:r>
-              <a:r>
-                <a:rPr lang="de-DE" dirty="0" smtClean="0"/>
-                <a:t>()</a:t>
-              </a:r>
-              <a:endParaRPr lang="de-DE" dirty="0"/>
-            </a:p>
-          </p:txBody>
-        </p:sp>
         <p:cxnSp>
           <p:nvCxnSpPr>
             <p:cNvPr id="63" name="Gewinkelte Verbindung 62"/>
@@ -4410,6 +4376,40 @@
               <a:r>
                 <a:rPr lang="de-DE" dirty="0" err="1" smtClean="0"/>
                 <a:t>code</a:t>
+              </a:r>
+              <a:endParaRPr lang="de-DE" dirty="0"/>
+            </a:p>
+          </p:txBody>
+        </p:sp>
+        <p:sp>
+          <p:nvSpPr>
+            <p:cNvPr id="13" name="Textfeld 12"/>
+            <p:cNvSpPr txBox="1"/>
+            <p:nvPr/>
+          </p:nvSpPr>
+          <p:spPr>
+            <a:xfrm>
+              <a:off x="4320925" y="2636896"/>
+              <a:ext cx="2084534" cy="369332"/>
+            </a:xfrm>
+            <a:prstGeom prst="rect">
+              <a:avLst/>
+            </a:prstGeom>
+            <a:noFill/>
+          </p:spPr>
+          <p:txBody>
+            <a:bodyPr wrap="square" rtlCol="0">
+              <a:spAutoFit/>
+            </a:bodyPr>
+            <a:lstStyle/>
+            <a:p>
+              <a:r>
+                <a:rPr lang="de-DE" dirty="0" err="1" smtClean="0"/>
+                <a:t>Gethostbyname</a:t>
+              </a:r>
+              <a:r>
+                <a:rPr lang="de-DE" dirty="0" smtClean="0"/>
+                <a:t>()</a:t>
               </a:r>
               <a:endParaRPr lang="de-DE" dirty="0"/>
             </a:p>

</xml_diff>